<commit_message>
Update Week 08 Software Design.pptx
</commit_message>
<xml_diff>
--- a/Slides/Week 08 Software Design.pptx
+++ b/Slides/Week 08 Software Design.pptx
@@ -237,7 +237,7 @@
           <a:p>
             <a:fld id="{0FEC1AAB-5E7C-43B3-93F1-3B00C2708E32}" type="datetimeFigureOut">
               <a:rPr lang="th-TH" smtClean="0"/>
-              <a:t>01/10/61</a:t>
+              <a:t>04/10/62</a:t>
             </a:fld>
             <a:endParaRPr lang="th-TH"/>
           </a:p>
@@ -415,7 +415,7 @@
           <a:p>
             <a:fld id="{5B1B5456-0566-42F4-BCC8-DF5300E15663}" type="datetimeFigureOut">
               <a:rPr lang="th-TH" smtClean="0"/>
-              <a:t>01/10/61</a:t>
+              <a:t>04/10/62</a:t>
             </a:fld>
             <a:endParaRPr lang="th-TH"/>
           </a:p>
@@ -1133,7 +1133,7 @@
           <a:p>
             <a:r>
               <a:rPr lang="th-TH"/>
-              <a:t>2561.10.02</a:t>
+              <a:t>2562.10.04</a:t>
             </a:r>
           </a:p>
         </p:txBody>
@@ -1306,7 +1306,7 @@
           <a:p>
             <a:r>
               <a:rPr lang="th-TH"/>
-              <a:t>2561.10.02</a:t>
+              <a:t>2562.10.04</a:t>
             </a:r>
           </a:p>
         </p:txBody>
@@ -1489,7 +1489,7 @@
           <a:p>
             <a:r>
               <a:rPr lang="th-TH"/>
-              <a:t>2561.10.02</a:t>
+              <a:t>2562.10.04</a:t>
             </a:r>
           </a:p>
         </p:txBody>
@@ -1727,7 +1727,7 @@
           <a:p>
             <a:r>
               <a:rPr lang="th-TH"/>
-              <a:t>2561.10.02</a:t>
+              <a:t>2562.10.04</a:t>
             </a:r>
             <a:endParaRPr lang="th-TH" dirty="0"/>
           </a:p>
@@ -1998,7 +1998,7 @@
           <a:p>
             <a:r>
               <a:rPr lang="th-TH"/>
-              <a:t>2561.10.02</a:t>
+              <a:t>2562.10.04</a:t>
             </a:r>
           </a:p>
         </p:txBody>
@@ -2239,7 +2239,7 @@
           <a:p>
             <a:r>
               <a:rPr lang="th-TH"/>
-              <a:t>2561.10.02</a:t>
+              <a:t>2562.10.04</a:t>
             </a:r>
           </a:p>
         </p:txBody>
@@ -2609,7 +2609,7 @@
           <a:p>
             <a:r>
               <a:rPr lang="th-TH"/>
-              <a:t>2561.10.02</a:t>
+              <a:t>2562.10.04</a:t>
             </a:r>
           </a:p>
         </p:txBody>
@@ -2735,7 +2735,7 @@
           <a:p>
             <a:r>
               <a:rPr lang="th-TH"/>
-              <a:t>2561.10.02</a:t>
+              <a:t>2562.10.04</a:t>
             </a:r>
           </a:p>
         </p:txBody>
@@ -2833,7 +2833,7 @@
           <a:p>
             <a:r>
               <a:rPr lang="th-TH"/>
-              <a:t>2561.10.02</a:t>
+              <a:t>2562.10.04</a:t>
             </a:r>
           </a:p>
         </p:txBody>
@@ -3113,7 +3113,7 @@
           <a:p>
             <a:r>
               <a:rPr lang="th-TH"/>
-              <a:t>2561.10.02</a:t>
+              <a:t>2562.10.04</a:t>
             </a:r>
           </a:p>
         </p:txBody>
@@ -3373,7 +3373,7 @@
           <a:p>
             <a:r>
               <a:rPr lang="th-TH"/>
-              <a:t>2561.10.02</a:t>
+              <a:t>2562.10.04</a:t>
             </a:r>
           </a:p>
         </p:txBody>
@@ -3589,7 +3589,7 @@
           <a:p>
             <a:r>
               <a:rPr lang="th-TH"/>
-              <a:t>2561.10.02</a:t>
+              <a:t>2562.10.04</a:t>
             </a:r>
           </a:p>
         </p:txBody>
@@ -4329,7 +4329,7 @@
           <a:p>
             <a:r>
               <a:rPr lang="th-TH"/>
-              <a:t>2561.10.02</a:t>
+              <a:t>2562.10.04</a:t>
             </a:r>
             <a:endParaRPr lang="th-TH" dirty="0"/>
           </a:p>
@@ -4532,7 +4532,7 @@
           <a:p>
             <a:r>
               <a:rPr lang="th-TH"/>
-              <a:t>2561.10.02</a:t>
+              <a:t>2562.10.04</a:t>
             </a:r>
             <a:endParaRPr lang="th-TH" dirty="0"/>
           </a:p>
@@ -4711,7 +4711,7 @@
           <a:p>
             <a:r>
               <a:rPr lang="th-TH"/>
-              <a:t>2561.10.02</a:t>
+              <a:t>2562.10.04</a:t>
             </a:r>
           </a:p>
         </p:txBody>
@@ -4937,7 +4937,7 @@
           <a:p>
             <a:r>
               <a:rPr lang="th-TH"/>
-              <a:t>2561.10.02</a:t>
+              <a:t>2562.10.04</a:t>
             </a:r>
             <a:endParaRPr lang="th-TH" dirty="0"/>
           </a:p>
@@ -5551,7 +5551,7 @@
           <a:p>
             <a:r>
               <a:rPr lang="th-TH"/>
-              <a:t>2561.10.02</a:t>
+              <a:t>2562.10.04</a:t>
             </a:r>
             <a:endParaRPr lang="th-TH" dirty="0"/>
           </a:p>
@@ -5731,7 +5731,7 @@
           <a:p>
             <a:r>
               <a:rPr lang="th-TH"/>
-              <a:t>2561.10.02</a:t>
+              <a:t>2562.10.04</a:t>
             </a:r>
             <a:endParaRPr lang="th-TH" dirty="0"/>
           </a:p>
@@ -6016,7 +6016,7 @@
           <a:p>
             <a:r>
               <a:rPr lang="th-TH"/>
-              <a:t>2561.10.02</a:t>
+              <a:t>2562.10.04</a:t>
             </a:r>
             <a:endParaRPr lang="th-TH" dirty="0"/>
           </a:p>
@@ -6195,7 +6195,7 @@
           <a:p>
             <a:r>
               <a:rPr lang="th-TH"/>
-              <a:t>2561.10.02</a:t>
+              <a:t>2562.10.04</a:t>
             </a:r>
             <a:endParaRPr lang="th-TH" dirty="0"/>
           </a:p>
@@ -6638,7 +6638,7 @@
           <a:p>
             <a:r>
               <a:rPr lang="th-TH"/>
-              <a:t>2561.10.02</a:t>
+              <a:t>2562.10.04</a:t>
             </a:r>
             <a:endParaRPr lang="th-TH" dirty="0"/>
           </a:p>
@@ -7026,7 +7026,7 @@
           <a:p>
             <a:r>
               <a:rPr lang="th-TH"/>
-              <a:t>2561.10.02</a:t>
+              <a:t>2562.10.04</a:t>
             </a:r>
             <a:endParaRPr lang="th-TH" dirty="0"/>
           </a:p>
@@ -7246,7 +7246,7 @@
           <a:p>
             <a:r>
               <a:rPr lang="th-TH"/>
-              <a:t>2561.10.02</a:t>
+              <a:t>2562.10.04</a:t>
             </a:r>
             <a:endParaRPr lang="th-TH" dirty="0"/>
           </a:p>
@@ -7425,7 +7425,7 @@
           <a:p>
             <a:r>
               <a:rPr lang="th-TH"/>
-              <a:t>2561.10.02</a:t>
+              <a:t>2562.10.04</a:t>
             </a:r>
             <a:endParaRPr lang="th-TH" dirty="0"/>
           </a:p>
@@ -7696,7 +7696,7 @@
           <a:p>
             <a:r>
               <a:rPr lang="th-TH"/>
-              <a:t>2561.10.02</a:t>
+              <a:t>2562.10.04</a:t>
             </a:r>
             <a:endParaRPr lang="th-TH" dirty="0"/>
           </a:p>
@@ -7843,7 +7843,7 @@
           <a:p>
             <a:r>
               <a:rPr lang="th-TH"/>
-              <a:t>2561.10.02</a:t>
+              <a:t>2562.10.04</a:t>
             </a:r>
             <a:endParaRPr lang="th-TH" dirty="0"/>
           </a:p>
@@ -8477,7 +8477,7 @@
           <a:p>
             <a:r>
               <a:rPr lang="th-TH"/>
-              <a:t>2561.10.02</a:t>
+              <a:t>2562.10.04</a:t>
             </a:r>
             <a:endParaRPr lang="th-TH" dirty="0"/>
           </a:p>
@@ -8663,7 +8663,7 @@
           <a:p>
             <a:r>
               <a:rPr lang="th-TH"/>
-              <a:t>2561.10.02</a:t>
+              <a:t>2562.10.04</a:t>
             </a:r>
             <a:endParaRPr lang="th-TH" dirty="0"/>
           </a:p>
@@ -9092,7 +9092,7 @@
           <a:p>
             <a:r>
               <a:rPr lang="th-TH"/>
-              <a:t>2561.10.02</a:t>
+              <a:t>2562.10.04</a:t>
             </a:r>
             <a:endParaRPr lang="th-TH" dirty="0"/>
           </a:p>
@@ -9239,7 +9239,7 @@
           <a:p>
             <a:r>
               <a:rPr lang="th-TH"/>
-              <a:t>2561.10.02</a:t>
+              <a:t>2562.10.04</a:t>
             </a:r>
             <a:endParaRPr lang="th-TH" dirty="0"/>
           </a:p>
@@ -9871,7 +9871,7 @@
           <a:p>
             <a:r>
               <a:rPr lang="th-TH"/>
-              <a:t>2561.10.02</a:t>
+              <a:t>2562.10.04</a:t>
             </a:r>
             <a:endParaRPr lang="th-TH" dirty="0"/>
           </a:p>
@@ -10058,7 +10058,7 @@
           <a:p>
             <a:r>
               <a:rPr lang="th-TH"/>
-              <a:t>2561.10.02</a:t>
+              <a:t>2562.10.04</a:t>
             </a:r>
             <a:endParaRPr lang="th-TH" dirty="0"/>
           </a:p>
@@ -10308,7 +10308,7 @@
           <a:p>
             <a:r>
               <a:rPr lang="th-TH"/>
-              <a:t>2561.10.02</a:t>
+              <a:t>2562.10.04</a:t>
             </a:r>
             <a:endParaRPr lang="th-TH" dirty="0"/>
           </a:p>
@@ -10693,7 +10693,7 @@
           <a:p>
             <a:r>
               <a:rPr lang="th-TH"/>
-              <a:t>2561.10.02</a:t>
+              <a:t>2562.10.04</a:t>
             </a:r>
             <a:endParaRPr lang="th-TH" dirty="0"/>
           </a:p>
@@ -10839,7 +10839,7 @@
           <a:p>
             <a:r>
               <a:rPr lang="th-TH"/>
-              <a:t>2561.10.02</a:t>
+              <a:t>2562.10.04</a:t>
             </a:r>
             <a:endParaRPr lang="th-TH" dirty="0"/>
           </a:p>
@@ -11511,7 +11511,7 @@
           <a:p>
             <a:r>
               <a:rPr lang="th-TH"/>
-              <a:t>2561.10.02</a:t>
+              <a:t>2562.10.04</a:t>
             </a:r>
             <a:endParaRPr lang="th-TH" dirty="0"/>
           </a:p>
@@ -11958,7 +11958,7 @@
           <a:p>
             <a:r>
               <a:rPr lang="th-TH"/>
-              <a:t>2561.10.02</a:t>
+              <a:t>2562.10.04</a:t>
             </a:r>
             <a:endParaRPr lang="th-TH" dirty="0"/>
           </a:p>
@@ -12105,7 +12105,7 @@
           <a:p>
             <a:r>
               <a:rPr lang="th-TH"/>
-              <a:t>2561.10.02</a:t>
+              <a:t>2562.10.04</a:t>
             </a:r>
             <a:endParaRPr lang="th-TH" dirty="0"/>
           </a:p>
@@ -12777,7 +12777,7 @@
           <a:p>
             <a:r>
               <a:rPr lang="th-TH"/>
-              <a:t>2561.10.02</a:t>
+              <a:t>2562.10.04</a:t>
             </a:r>
             <a:endParaRPr lang="th-TH" dirty="0"/>
           </a:p>
@@ -13182,7 +13182,7 @@
           <a:p>
             <a:r>
               <a:rPr lang="th-TH"/>
-              <a:t>2561.10.02</a:t>
+              <a:t>2562.10.04</a:t>
             </a:r>
             <a:endParaRPr lang="th-TH" dirty="0"/>
           </a:p>
@@ -13329,7 +13329,7 @@
           <a:p>
             <a:r>
               <a:rPr lang="th-TH"/>
-              <a:t>2561.10.02</a:t>
+              <a:t>2562.10.04</a:t>
             </a:r>
             <a:endParaRPr lang="th-TH" dirty="0"/>
           </a:p>
@@ -14025,7 +14025,7 @@
           <a:p>
             <a:r>
               <a:rPr lang="th-TH"/>
-              <a:t>2561.10.02</a:t>
+              <a:t>2562.10.04</a:t>
             </a:r>
             <a:endParaRPr lang="th-TH" dirty="0"/>
           </a:p>
@@ -14205,7 +14205,7 @@
           <a:p>
             <a:r>
               <a:rPr lang="th-TH"/>
-              <a:t>2561.10.02</a:t>
+              <a:t>2562.10.04</a:t>
             </a:r>
             <a:endParaRPr lang="th-TH" dirty="0"/>
           </a:p>
@@ -14572,7 +14572,7 @@
           <a:p>
             <a:r>
               <a:rPr lang="th-TH"/>
-              <a:t>2561.10.02</a:t>
+              <a:t>2562.10.04</a:t>
             </a:r>
             <a:endParaRPr lang="th-TH" dirty="0"/>
           </a:p>
@@ -14918,7 +14918,7 @@
           <a:p>
             <a:r>
               <a:rPr lang="th-TH"/>
-              <a:t>2561.10.02</a:t>
+              <a:t>2562.10.04</a:t>
             </a:r>
             <a:endParaRPr lang="th-TH" dirty="0"/>
           </a:p>
@@ -15143,7 +15143,7 @@
           <a:p>
             <a:r>
               <a:rPr lang="th-TH"/>
-              <a:t>2561.10.02</a:t>
+              <a:t>2562.10.04</a:t>
             </a:r>
             <a:endParaRPr lang="th-TH" dirty="0"/>
           </a:p>
@@ -15565,7 +15565,7 @@
           <a:p>
             <a:r>
               <a:rPr lang="th-TH"/>
-              <a:t>2561.10.02</a:t>
+              <a:t>2562.10.04</a:t>
             </a:r>
             <a:endParaRPr lang="th-TH" dirty="0"/>
           </a:p>
@@ -15908,7 +15908,7 @@
           <a:p>
             <a:r>
               <a:rPr lang="th-TH"/>
-              <a:t>2561.10.02</a:t>
+              <a:t>2562.10.04</a:t>
             </a:r>
             <a:endParaRPr lang="th-TH" dirty="0"/>
           </a:p>
@@ -16179,7 +16179,7 @@
           <a:p>
             <a:r>
               <a:rPr lang="th-TH"/>
-              <a:t>2561.10.02</a:t>
+              <a:t>2562.10.04</a:t>
             </a:r>
             <a:endParaRPr lang="th-TH" dirty="0"/>
           </a:p>
@@ -16365,7 +16365,7 @@
           <a:p>
             <a:r>
               <a:rPr lang="th-TH"/>
-              <a:t>2561.10.02</a:t>
+              <a:t>2562.10.04</a:t>
             </a:r>
             <a:endParaRPr lang="th-TH" dirty="0"/>
           </a:p>
@@ -16546,7 +16546,7 @@
           <a:p>
             <a:r>
               <a:rPr lang="th-TH"/>
-              <a:t>2561.10.02</a:t>
+              <a:t>2562.10.04</a:t>
             </a:r>
             <a:endParaRPr lang="th-TH" dirty="0"/>
           </a:p>
@@ -16826,7 +16826,7 @@
           <a:p>
             <a:r>
               <a:rPr lang="th-TH"/>
-              <a:t>2561.10.02</a:t>
+              <a:t>2562.10.04</a:t>
             </a:r>
             <a:endParaRPr lang="th-TH" dirty="0"/>
           </a:p>
@@ -17005,7 +17005,7 @@
           <a:p>
             <a:r>
               <a:rPr lang="th-TH"/>
-              <a:t>2561.10.02</a:t>
+              <a:t>2562.10.04</a:t>
             </a:r>
             <a:endParaRPr lang="th-TH" dirty="0"/>
           </a:p>
@@ -17184,7 +17184,7 @@
           <a:p>
             <a:r>
               <a:rPr lang="th-TH"/>
-              <a:t>2561.10.02</a:t>
+              <a:t>2562.10.04</a:t>
             </a:r>
             <a:endParaRPr lang="th-TH" dirty="0"/>
           </a:p>
@@ -17564,7 +17564,7 @@
           <a:p>
             <a:r>
               <a:rPr lang="th-TH"/>
-              <a:t>2561.10.02</a:t>
+              <a:t>2562.10.04</a:t>
             </a:r>
             <a:endParaRPr lang="th-TH" dirty="0"/>
           </a:p>
@@ -17801,7 +17801,7 @@
           <a:p>
             <a:r>
               <a:rPr lang="th-TH"/>
-              <a:t>2561.10.02</a:t>
+              <a:t>2562.10.04</a:t>
             </a:r>
             <a:endParaRPr lang="th-TH" dirty="0"/>
           </a:p>
@@ -18085,7 +18085,7 @@
           <a:p>
             <a:r>
               <a:rPr lang="th-TH"/>
-              <a:t>2561.10.02</a:t>
+              <a:t>2562.10.04</a:t>
             </a:r>
             <a:endParaRPr lang="th-TH" dirty="0"/>
           </a:p>
@@ -18384,7 +18384,7 @@
           <a:p>
             <a:r>
               <a:rPr lang="th-TH"/>
-              <a:t>2561.10.02</a:t>
+              <a:t>2562.10.04</a:t>
             </a:r>
             <a:endParaRPr lang="th-TH" dirty="0"/>
           </a:p>
@@ -18570,7 +18570,7 @@
           <a:p>
             <a:r>
               <a:rPr lang="th-TH"/>
-              <a:t>2561.10.02</a:t>
+              <a:t>2562.10.04</a:t>
             </a:r>
             <a:endParaRPr lang="th-TH" dirty="0"/>
           </a:p>
@@ -18931,7 +18931,7 @@
           <a:p>
             <a:r>
               <a:rPr lang="th-TH"/>
-              <a:t>2561.10.02</a:t>
+              <a:t>2562.10.04</a:t>
             </a:r>
             <a:endParaRPr lang="th-TH" dirty="0"/>
           </a:p>
@@ -19201,7 +19201,7 @@
           <a:p>
             <a:r>
               <a:rPr lang="th-TH"/>
-              <a:t>2561.10.02</a:t>
+              <a:t>2562.10.04</a:t>
             </a:r>
             <a:endParaRPr lang="th-TH" dirty="0"/>
           </a:p>
@@ -19387,7 +19387,7 @@
           <a:p>
             <a:r>
               <a:rPr lang="th-TH"/>
-              <a:t>2561.10.02</a:t>
+              <a:t>2562.10.04</a:t>
             </a:r>
             <a:endParaRPr lang="th-TH" dirty="0"/>
           </a:p>
@@ -19534,7 +19534,7 @@
           <a:p>
             <a:r>
               <a:rPr lang="th-TH"/>
-              <a:t>2561.10.02</a:t>
+              <a:t>2562.10.04</a:t>
             </a:r>
             <a:endParaRPr lang="th-TH" dirty="0"/>
           </a:p>
@@ -19845,7 +19845,7 @@
           <a:p>
             <a:r>
               <a:rPr lang="th-TH"/>
-              <a:t>2561.10.02</a:t>
+              <a:t>2562.10.04</a:t>
             </a:r>
             <a:endParaRPr lang="th-TH" dirty="0"/>
           </a:p>
@@ -20181,7 +20181,7 @@
           <a:p>
             <a:r>
               <a:rPr lang="th-TH"/>
-              <a:t>2561.10.02</a:t>
+              <a:t>2562.10.04</a:t>
             </a:r>
             <a:endParaRPr lang="th-TH" dirty="0"/>
           </a:p>
@@ -20385,7 +20385,7 @@
           <a:p>
             <a:r>
               <a:rPr lang="th-TH"/>
-              <a:t>2561.10.02</a:t>
+              <a:t>2562.10.04</a:t>
             </a:r>
             <a:endParaRPr lang="th-TH" dirty="0"/>
           </a:p>
@@ -20753,7 +20753,7 @@
           <a:p>
             <a:r>
               <a:rPr lang="th-TH"/>
-              <a:t>2561.10.02</a:t>
+              <a:t>2562.10.04</a:t>
             </a:r>
             <a:endParaRPr lang="th-TH" dirty="0"/>
           </a:p>
@@ -20928,7 +20928,7 @@
           <a:p>
             <a:r>
               <a:rPr lang="th-TH"/>
-              <a:t>2561.10.02</a:t>
+              <a:t>2562.10.04</a:t>
             </a:r>
             <a:endParaRPr lang="th-TH" dirty="0"/>
           </a:p>
@@ -21183,7 +21183,7 @@
           <a:p>
             <a:r>
               <a:rPr lang="th-TH"/>
-              <a:t>2561.10.02</a:t>
+              <a:t>2562.10.04</a:t>
             </a:r>
             <a:endParaRPr lang="th-TH" dirty="0"/>
           </a:p>
@@ -21392,7 +21392,7 @@
           <a:p>
             <a:r>
               <a:rPr lang="th-TH"/>
-              <a:t>2561.10.02</a:t>
+              <a:t>2562.10.04</a:t>
             </a:r>
             <a:endParaRPr lang="th-TH" dirty="0"/>
           </a:p>
@@ -21642,7 +21642,7 @@
           <a:p>
             <a:r>
               <a:rPr lang="th-TH"/>
-              <a:t>2561.10.02</a:t>
+              <a:t>2562.10.04</a:t>
             </a:r>
             <a:endParaRPr lang="th-TH" dirty="0"/>
           </a:p>

</xml_diff>